<commit_message>
+__init__py $PAB SB MAIN
Signed-off-by: Yujin Wang <yujin.wang@autoliv.com>
</commit_message>
<xml_diff>
--- a/Python/Howtouse/Git Usage Instruction.pptx
+++ b/Python/Howtouse/Git Usage Instruction.pptx
@@ -263,7 +263,7 @@
           <a:p>
             <a:fld id="{836FE243-FF01-4BF1-BE4A-55E7CA9733BD}" type="datetimeFigureOut">
               <a:rPr lang="zh-CN" altLang="en-US" smtClean="0"/>
-              <a:t>2018/5/21</a:t>
+              <a:t>2018/7/10</a:t>
             </a:fld>
             <a:endParaRPr lang="zh-CN" altLang="en-US"/>
           </a:p>
@@ -433,7 +433,7 @@
           <a:p>
             <a:fld id="{836FE243-FF01-4BF1-BE4A-55E7CA9733BD}" type="datetimeFigureOut">
               <a:rPr lang="zh-CN" altLang="en-US" smtClean="0"/>
-              <a:t>2018/5/21</a:t>
+              <a:t>2018/7/10</a:t>
             </a:fld>
             <a:endParaRPr lang="zh-CN" altLang="en-US"/>
           </a:p>
@@ -613,7 +613,7 @@
           <a:p>
             <a:fld id="{836FE243-FF01-4BF1-BE4A-55E7CA9733BD}" type="datetimeFigureOut">
               <a:rPr lang="zh-CN" altLang="en-US" smtClean="0"/>
-              <a:t>2018/5/21</a:t>
+              <a:t>2018/7/10</a:t>
             </a:fld>
             <a:endParaRPr lang="zh-CN" altLang="en-US"/>
           </a:p>
@@ -783,7 +783,7 @@
           <a:p>
             <a:fld id="{836FE243-FF01-4BF1-BE4A-55E7CA9733BD}" type="datetimeFigureOut">
               <a:rPr lang="zh-CN" altLang="en-US" smtClean="0"/>
-              <a:t>2018/5/21</a:t>
+              <a:t>2018/7/10</a:t>
             </a:fld>
             <a:endParaRPr lang="zh-CN" altLang="en-US"/>
           </a:p>
@@ -1029,7 +1029,7 @@
           <a:p>
             <a:fld id="{836FE243-FF01-4BF1-BE4A-55E7CA9733BD}" type="datetimeFigureOut">
               <a:rPr lang="zh-CN" altLang="en-US" smtClean="0"/>
-              <a:t>2018/5/21</a:t>
+              <a:t>2018/7/10</a:t>
             </a:fld>
             <a:endParaRPr lang="zh-CN" altLang="en-US"/>
           </a:p>
@@ -1261,7 +1261,7 @@
           <a:p>
             <a:fld id="{836FE243-FF01-4BF1-BE4A-55E7CA9733BD}" type="datetimeFigureOut">
               <a:rPr lang="zh-CN" altLang="en-US" smtClean="0"/>
-              <a:t>2018/5/21</a:t>
+              <a:t>2018/7/10</a:t>
             </a:fld>
             <a:endParaRPr lang="zh-CN" altLang="en-US"/>
           </a:p>
@@ -1628,7 +1628,7 @@
           <a:p>
             <a:fld id="{836FE243-FF01-4BF1-BE4A-55E7CA9733BD}" type="datetimeFigureOut">
               <a:rPr lang="zh-CN" altLang="en-US" smtClean="0"/>
-              <a:t>2018/5/21</a:t>
+              <a:t>2018/7/10</a:t>
             </a:fld>
             <a:endParaRPr lang="zh-CN" altLang="en-US"/>
           </a:p>
@@ -1746,7 +1746,7 @@
           <a:p>
             <a:fld id="{836FE243-FF01-4BF1-BE4A-55E7CA9733BD}" type="datetimeFigureOut">
               <a:rPr lang="zh-CN" altLang="en-US" smtClean="0"/>
-              <a:t>2018/5/21</a:t>
+              <a:t>2018/7/10</a:t>
             </a:fld>
             <a:endParaRPr lang="zh-CN" altLang="en-US"/>
           </a:p>
@@ -1841,7 +1841,7 @@
           <a:p>
             <a:fld id="{836FE243-FF01-4BF1-BE4A-55E7CA9733BD}" type="datetimeFigureOut">
               <a:rPr lang="zh-CN" altLang="en-US" smtClean="0"/>
-              <a:t>2018/5/21</a:t>
+              <a:t>2018/7/10</a:t>
             </a:fld>
             <a:endParaRPr lang="zh-CN" altLang="en-US"/>
           </a:p>
@@ -2118,7 +2118,7 @@
           <a:p>
             <a:fld id="{836FE243-FF01-4BF1-BE4A-55E7CA9733BD}" type="datetimeFigureOut">
               <a:rPr lang="zh-CN" altLang="en-US" smtClean="0"/>
-              <a:t>2018/5/21</a:t>
+              <a:t>2018/7/10</a:t>
             </a:fld>
             <a:endParaRPr lang="zh-CN" altLang="en-US"/>
           </a:p>
@@ -2371,7 +2371,7 @@
           <a:p>
             <a:fld id="{836FE243-FF01-4BF1-BE4A-55E7CA9733BD}" type="datetimeFigureOut">
               <a:rPr lang="zh-CN" altLang="en-US" smtClean="0"/>
-              <a:t>2018/5/21</a:t>
+              <a:t>2018/7/10</a:t>
             </a:fld>
             <a:endParaRPr lang="zh-CN" altLang="en-US"/>
           </a:p>
@@ -2584,7 +2584,7 @@
           <a:p>
             <a:fld id="{836FE243-FF01-4BF1-BE4A-55E7CA9733BD}" type="datetimeFigureOut">
               <a:rPr lang="zh-CN" altLang="en-US" smtClean="0"/>
-              <a:t>2018/5/21</a:t>
+              <a:t>2018/7/10</a:t>
             </a:fld>
             <a:endParaRPr lang="zh-CN" altLang="en-US"/>
           </a:p>
@@ -3289,7 +3289,7 @@
         <p:spPr>
           <a:xfrm>
             <a:off x="207951" y="536970"/>
-            <a:ext cx="4502002" cy="1754326"/>
+            <a:ext cx="4502002" cy="1477328"/>
           </a:xfrm>
           <a:prstGeom prst="rect">
             <a:avLst/>
@@ -3346,12 +3346,6 @@
           </a:p>
           <a:p>
             <a:endParaRPr lang="en-US" altLang="zh-CN" dirty="0"/>
-          </a:p>
-          <a:p>
-            <a:r>
-              <a:rPr lang="en-US" altLang="zh-CN" dirty="0" smtClean="0"/>
-              <a:t>2. Open id_rsa.pub</a:t>
-            </a:r>
           </a:p>
           <a:p>
             <a:endParaRPr lang="zh-CN" altLang="en-US" dirty="0"/>
@@ -3367,7 +3361,7 @@
           <p:nvPr/>
         </p:nvPicPr>
         <p:blipFill>
-          <a:blip r:embed="rId3">
+          <a:blip r:embed="rId3" cstate="print">
             <a:extLst>
               <a:ext uri="{28A0092B-C50C-407E-A947-70E740481C1C}">
                 <a14:useLocalDpi xmlns:a14="http://schemas.microsoft.com/office/drawing/2010/main" val="0"/>
@@ -3380,8 +3374,8 @@
         </p:blipFill>
         <p:spPr>
           <a:xfrm>
-            <a:off x="207951" y="2028267"/>
-            <a:ext cx="3705726" cy="1076554"/>
+            <a:off x="409302" y="2731143"/>
+            <a:ext cx="2572557" cy="747356"/>
           </a:xfrm>
           <a:prstGeom prst="rect">
             <a:avLst/>
@@ -3600,7 +3594,6 @@
               <a:rPr lang="en-US" altLang="zh-CN" dirty="0" smtClean="0"/>
               <a:t> clone SSH KEYS</a:t>
             </a:r>
-            <a:endParaRPr lang="en-US" altLang="zh-CN" dirty="0" smtClean="0"/>
           </a:p>
         </p:txBody>
       </p:sp>
@@ -3756,6 +3749,82 @@
           </a:p>
         </p:txBody>
       </p:sp>
+      <p:pic>
+        <p:nvPicPr>
+          <p:cNvPr id="3" name="Picture 2"/>
+          <p:cNvPicPr>
+            <a:picLocks noChangeAspect="1"/>
+          </p:cNvPicPr>
+          <p:nvPr/>
+        </p:nvPicPr>
+        <p:blipFill>
+          <a:blip r:embed="rId6"/>
+          <a:stretch>
+            <a:fillRect/>
+          </a:stretch>
+        </p:blipFill>
+        <p:spPr>
+          <a:xfrm>
+            <a:off x="225187" y="1744893"/>
+            <a:ext cx="2426176" cy="436543"/>
+          </a:xfrm>
+          <a:prstGeom prst="rect">
+            <a:avLst/>
+          </a:prstGeom>
+        </p:spPr>
+      </p:pic>
+      <p:sp>
+        <p:nvSpPr>
+          <p:cNvPr id="7" name="Rectangle 6"/>
+          <p:cNvSpPr/>
+          <p:nvPr/>
+        </p:nvSpPr>
+        <p:spPr>
+          <a:xfrm>
+            <a:off x="207950" y="2364672"/>
+            <a:ext cx="1966436" cy="369332"/>
+          </a:xfrm>
+          <a:prstGeom prst="rect">
+            <a:avLst/>
+          </a:prstGeom>
+        </p:spPr>
+        <p:txBody>
+          <a:bodyPr wrap="none">
+            <a:spAutoFit/>
+          </a:bodyPr>
+          <a:lstStyle/>
+          <a:p>
+            <a:r>
+              <a:rPr lang="en-US" altLang="zh-CN" dirty="0"/>
+              <a:t>2. Open id_rsa.pub</a:t>
+            </a:r>
+          </a:p>
+        </p:txBody>
+      </p:sp>
+      <p:pic>
+        <p:nvPicPr>
+          <p:cNvPr id="8" name="Picture 7"/>
+          <p:cNvPicPr>
+            <a:picLocks noChangeAspect="1"/>
+          </p:cNvPicPr>
+          <p:nvPr/>
+        </p:nvPicPr>
+        <p:blipFill>
+          <a:blip r:embed="rId7"/>
+          <a:stretch>
+            <a:fillRect/>
+          </a:stretch>
+        </p:blipFill>
+        <p:spPr>
+          <a:xfrm>
+            <a:off x="2981859" y="1568532"/>
+            <a:ext cx="1384980" cy="991058"/>
+          </a:xfrm>
+          <a:prstGeom prst="rect">
+            <a:avLst/>
+          </a:prstGeom>
+        </p:spPr>
+      </p:pic>
     </p:spTree>
     <p:extLst>
       <p:ext uri="{BB962C8B-B14F-4D97-AF65-F5344CB8AC3E}">
@@ -5093,7 +5162,6 @@
               <a:rPr lang="en-US" altLang="zh-CN" dirty="0" smtClean="0"/>
               <a:t>(recommend)</a:t>
             </a:r>
-            <a:endParaRPr lang="en-US" altLang="zh-CN" dirty="0" smtClean="0"/>
           </a:p>
           <a:p>
             <a:r>
@@ -5102,11 +5170,7 @@
             </a:r>
             <a:r>
               <a:rPr lang="en-US" altLang="zh-CN" dirty="0" smtClean="0"/>
-              <a:t> </a:t>
-            </a:r>
-            <a:r>
-              <a:rPr lang="en-US" altLang="zh-CN" dirty="0" smtClean="0"/>
-              <a:t>pull </a:t>
+              <a:t> pull </a:t>
             </a:r>
             <a:r>
               <a:rPr lang="en-US" altLang="zh-CN" dirty="0" err="1" smtClean="0"/>

</xml_diff>